<commit_message>
Add nginx-ingress and secrets for cloudnative-pg, keycloak, and backstage
</commit_message>
<xml_diff>
--- a/idp-kubernetes.pptx
+++ b/idp-kubernetes.pptx
@@ -5,7 +5,7 @@
     <p:sldMasterId id="2147483659" r:id="rId1"/>
   </p:sldMasterIdLst>
   <p:notesMasterIdLst>
-    <p:notesMasterId r:id="rId11"/>
+    <p:notesMasterId r:id="rId13"/>
   </p:notesMasterIdLst>
   <p:sldIdLst>
     <p:sldId id="256" r:id="rId2"/>
@@ -17,16 +17,18 @@
     <p:sldId id="262" r:id="rId8"/>
     <p:sldId id="263" r:id="rId9"/>
     <p:sldId id="264" r:id="rId10"/>
+    <p:sldId id="265" r:id="rId11"/>
+    <p:sldId id="266" r:id="rId12"/>
   </p:sldIdLst>
   <p:sldSz cx="9144000" cy="5143500" type="screen16x9"/>
   <p:notesSz cx="6858000" cy="9144000"/>
   <p:embeddedFontLst>
     <p:embeddedFont>
       <p:font typeface="Roboto" panose="02000000000000000000" pitchFamily="2" charset="0"/>
-      <p:regular r:id="rId12"/>
-      <p:bold r:id="rId13"/>
-      <p:italic r:id="rId14"/>
-      <p:boldItalic r:id="rId15"/>
+      <p:regular r:id="rId14"/>
+      <p:bold r:id="rId15"/>
+      <p:italic r:id="rId16"/>
+      <p:boldItalic r:id="rId17"/>
     </p:embeddedFont>
   </p:embeddedFontLst>
   <p:defaultTextStyle>
@@ -8335,8 +8337,8 @@
               <a:buNone/>
             </a:pPr>
             <a:r>
-              <a:rPr lang="en" dirty="0"/>
-              <a:t>IDP Kubernetes</a:t>
+              <a:rPr lang="en" dirty="0" err="1"/>
+              <a:t>Kuberise</a:t>
             </a:r>
             <a:endParaRPr dirty="0"/>
           </a:p>
@@ -8413,6 +8415,247 @@
         </p:txBody>
       </p:sp>
     </p:spTree>
+  </p:cSld>
+  <p:clrMapOvr>
+    <a:masterClrMapping/>
+  </p:clrMapOvr>
+</p:sld>
+</file>
+
+<file path=ppt/slides/slide10.xml><?xml version="1.0" encoding="utf-8"?>
+<p:sld xmlns:a="http://schemas.openxmlformats.org/drawingml/2006/main" xmlns:r="http://schemas.openxmlformats.org/officeDocument/2006/relationships" xmlns:p="http://schemas.openxmlformats.org/presentationml/2006/main">
+  <p:cSld>
+    <p:spTree>
+      <p:nvGrpSpPr>
+        <p:cNvPr id="1" name=""/>
+        <p:cNvGrpSpPr/>
+        <p:nvPr/>
+      </p:nvGrpSpPr>
+      <p:grpSpPr>
+        <a:xfrm>
+          <a:off x="0" y="0"/>
+          <a:ext cx="0" cy="0"/>
+          <a:chOff x="0" y="0"/>
+          <a:chExt cx="0" cy="0"/>
+        </a:xfrm>
+      </p:grpSpPr>
+      <p:sp>
+        <p:nvSpPr>
+          <p:cNvPr id="2" name="Title 1">
+            <a:extLst>
+              <a:ext uri="{FF2B5EF4-FFF2-40B4-BE49-F238E27FC236}">
+                <a16:creationId xmlns:a16="http://schemas.microsoft.com/office/drawing/2014/main" id="{26D01EC3-5861-972B-4209-F289A66504E6}"/>
+              </a:ext>
+            </a:extLst>
+          </p:cNvPr>
+          <p:cNvSpPr>
+            <a:spLocks noGrp="1"/>
+          </p:cNvSpPr>
+          <p:nvPr>
+            <p:ph type="title"/>
+          </p:nvPr>
+        </p:nvSpPr>
+        <p:spPr/>
+        <p:txBody>
+          <a:bodyPr>
+            <a:normAutofit fontScale="90000"/>
+          </a:bodyPr>
+          <a:lstStyle/>
+          <a:p>
+            <a:r>
+              <a:rPr lang="en-US" dirty="0"/>
+              <a:t>Talking about competitors and where is the place for my product </a:t>
+            </a:r>
+          </a:p>
+        </p:txBody>
+      </p:sp>
+    </p:spTree>
+    <p:extLst>
+      <p:ext uri="{BB962C8B-B14F-4D97-AF65-F5344CB8AC3E}">
+        <p14:creationId xmlns:p14="http://schemas.microsoft.com/office/powerpoint/2010/main" val="129487550"/>
+      </p:ext>
+    </p:extLst>
+  </p:cSld>
+  <p:clrMapOvr>
+    <a:masterClrMapping/>
+  </p:clrMapOvr>
+</p:sld>
+</file>
+
+<file path=ppt/slides/slide11.xml><?xml version="1.0" encoding="utf-8"?>
+<p:sld xmlns:a="http://schemas.openxmlformats.org/drawingml/2006/main" xmlns:r="http://schemas.openxmlformats.org/officeDocument/2006/relationships" xmlns:p="http://schemas.openxmlformats.org/presentationml/2006/main">
+  <p:cSld>
+    <p:spTree>
+      <p:nvGrpSpPr>
+        <p:cNvPr id="1" name=""/>
+        <p:cNvGrpSpPr/>
+        <p:nvPr/>
+      </p:nvGrpSpPr>
+      <p:grpSpPr>
+        <a:xfrm>
+          <a:off x="0" y="0"/>
+          <a:ext cx="0" cy="0"/>
+          <a:chOff x="0" y="0"/>
+          <a:chExt cx="0" cy="0"/>
+        </a:xfrm>
+      </p:grpSpPr>
+      <p:sp>
+        <p:nvSpPr>
+          <p:cNvPr id="2" name="Title 1">
+            <a:extLst>
+              <a:ext uri="{FF2B5EF4-FFF2-40B4-BE49-F238E27FC236}">
+                <a16:creationId xmlns:a16="http://schemas.microsoft.com/office/drawing/2014/main" id="{37BAA92D-6FD7-BDFC-D235-15F7CB190044}"/>
+              </a:ext>
+            </a:extLst>
+          </p:cNvPr>
+          <p:cNvSpPr>
+            <a:spLocks noGrp="1"/>
+          </p:cNvSpPr>
+          <p:nvPr>
+            <p:ph type="title"/>
+          </p:nvPr>
+        </p:nvSpPr>
+        <p:spPr/>
+        <p:txBody>
+          <a:bodyPr>
+            <a:normAutofit fontScale="90000"/>
+          </a:bodyPr>
+          <a:lstStyle/>
+          <a:p>
+            <a:r>
+              <a:rPr lang="en-US" dirty="0"/>
+              <a:t>Next Step</a:t>
+            </a:r>
+          </a:p>
+        </p:txBody>
+      </p:sp>
+      <p:sp>
+        <p:nvSpPr>
+          <p:cNvPr id="3" name="Text Placeholder 2">
+            <a:extLst>
+              <a:ext uri="{FF2B5EF4-FFF2-40B4-BE49-F238E27FC236}">
+                <a16:creationId xmlns:a16="http://schemas.microsoft.com/office/drawing/2014/main" id="{66E01D98-FB33-63A5-37B5-42B7366A15D7}"/>
+              </a:ext>
+            </a:extLst>
+          </p:cNvPr>
+          <p:cNvSpPr>
+            <a:spLocks noGrp="1"/>
+          </p:cNvSpPr>
+          <p:nvPr>
+            <p:ph type="body" idx="1"/>
+          </p:nvPr>
+        </p:nvSpPr>
+        <p:spPr/>
+        <p:txBody>
+          <a:bodyPr>
+            <a:normAutofit fontScale="92500" lnSpcReduction="10000"/>
+          </a:bodyPr>
+          <a:lstStyle/>
+          <a:p>
+            <a:r>
+              <a:rPr lang="en-US" dirty="0"/>
+              <a:t>Monitoring</a:t>
+            </a:r>
+          </a:p>
+          <a:p>
+            <a:pPr lvl="1"/>
+            <a:r>
+              <a:rPr lang="en-US" dirty="0"/>
+              <a:t>Dashboards </a:t>
+            </a:r>
+          </a:p>
+          <a:p>
+            <a:pPr lvl="1"/>
+            <a:r>
+              <a:rPr lang="en-US" dirty="0"/>
+              <a:t>Alerting </a:t>
+            </a:r>
+          </a:p>
+          <a:p>
+            <a:r>
+              <a:rPr lang="en-US" dirty="0"/>
+              <a:t>Security </a:t>
+            </a:r>
+          </a:p>
+          <a:p>
+            <a:pPr lvl="1"/>
+            <a:r>
+              <a:rPr lang="en-US" dirty="0" err="1"/>
+              <a:t>Hashicorp</a:t>
+            </a:r>
+            <a:r>
+              <a:rPr lang="en-US" dirty="0"/>
+              <a:t> Vault </a:t>
+            </a:r>
+          </a:p>
+          <a:p>
+            <a:pPr lvl="1"/>
+            <a:r>
+              <a:rPr lang="en-US" dirty="0"/>
+              <a:t>Access and roles </a:t>
+            </a:r>
+          </a:p>
+          <a:p>
+            <a:pPr lvl="1"/>
+            <a:r>
+              <a:rPr lang="en-US" dirty="0"/>
+              <a:t>SSL (Cert-Manager) </a:t>
+            </a:r>
+          </a:p>
+          <a:p>
+            <a:r>
+              <a:rPr lang="en-US" dirty="0"/>
+              <a:t>Automation </a:t>
+            </a:r>
+          </a:p>
+          <a:p>
+            <a:pPr lvl="1"/>
+            <a:r>
+              <a:rPr lang="en-US" dirty="0"/>
+              <a:t>CI Automation </a:t>
+            </a:r>
+          </a:p>
+          <a:p>
+            <a:r>
+              <a:rPr lang="en-US" dirty="0"/>
+              <a:t>Articles and readme (how to run) </a:t>
+            </a:r>
+          </a:p>
+          <a:p>
+            <a:r>
+              <a:rPr lang="en-US" dirty="0"/>
+              <a:t>Identify target audience (competitors and position in the market) </a:t>
+            </a:r>
+          </a:p>
+          <a:p>
+            <a:r>
+              <a:rPr lang="en-US"/>
+              <a:t>Finding the first client </a:t>
+            </a:r>
+            <a:endParaRPr lang="en-US" dirty="0"/>
+          </a:p>
+          <a:p>
+            <a:r>
+              <a:rPr lang="en-US" dirty="0"/>
+              <a:t>(remove: backstage, </a:t>
+            </a:r>
+            <a:r>
+              <a:rPr lang="en-US" dirty="0" err="1"/>
+              <a:t>Postgresql</a:t>
+            </a:r>
+            <a:r>
+              <a:rPr lang="en-US" dirty="0"/>
+              <a:t>, )</a:t>
+            </a:r>
+          </a:p>
+        </p:txBody>
+      </p:sp>
+    </p:spTree>
+    <p:extLst>
+      <p:ext uri="{BB962C8B-B14F-4D97-AF65-F5344CB8AC3E}">
+        <p14:creationId xmlns:p14="http://schemas.microsoft.com/office/powerpoint/2010/main" val="4171078801"/>
+      </p:ext>
+    </p:extLst>
   </p:cSld>
   <p:clrMapOvr>
     <a:masterClrMapping/>
@@ -9602,10 +9845,10 @@
               <a:buChar char="●"/>
             </a:pPr>
             <a:r>
-              <a:rPr lang="en"/>
+              <a:rPr lang="en" dirty="0"/>
               <a:t>Secrets are stored in Kubernetes Secrets and their sealed one in git repo</a:t>
             </a:r>
-            <a:endParaRPr/>
+            <a:endParaRPr dirty="0"/>
           </a:p>
           <a:p>
             <a:pPr marL="457200" lvl="0" indent="-342900" algn="l" rtl="0">
@@ -9619,10 +9862,10 @@
               <a:buChar char="●"/>
             </a:pPr>
             <a:r>
-              <a:rPr lang="en"/>
+              <a:rPr lang="en" dirty="0"/>
               <a:t>Using sealed-secrets</a:t>
             </a:r>
-            <a:endParaRPr/>
+            <a:endParaRPr dirty="0"/>
           </a:p>
           <a:p>
             <a:pPr marL="914400" lvl="0" indent="-342900" algn="l" rtl="0">
@@ -9636,10 +9879,14 @@
               <a:buAutoNum type="arabicPeriod"/>
             </a:pPr>
             <a:r>
-              <a:rPr lang="en"/>
-              <a:t>Kubeseal the secret</a:t>
+              <a:rPr lang="en" dirty="0" err="1"/>
+              <a:t>Kubeseal</a:t>
             </a:r>
-            <a:endParaRPr/>
+            <a:r>
+              <a:rPr lang="en" dirty="0"/>
+              <a:t> the secret</a:t>
+            </a:r>
+            <a:endParaRPr dirty="0"/>
           </a:p>
           <a:p>
             <a:pPr marL="914400" lvl="0" indent="-342900" algn="l" rtl="0">
@@ -9653,10 +9900,10 @@
               <a:buAutoNum type="arabicPeriod"/>
             </a:pPr>
             <a:r>
-              <a:rPr lang="en"/>
+              <a:rPr lang="en" dirty="0"/>
               <a:t>Add encrypted secret to the repo</a:t>
             </a:r>
-            <a:endParaRPr/>
+            <a:endParaRPr dirty="0"/>
           </a:p>
           <a:p>
             <a:pPr marL="914400" lvl="0" indent="-342900" algn="l" rtl="0">
@@ -9670,10 +9917,10 @@
               <a:buAutoNum type="arabicPeriod"/>
             </a:pPr>
             <a:r>
-              <a:rPr lang="en"/>
+              <a:rPr lang="en" dirty="0"/>
               <a:t>ArgoCD deploys sealed secret to the cluster </a:t>
             </a:r>
-            <a:endParaRPr/>
+            <a:endParaRPr dirty="0"/>
           </a:p>
           <a:p>
             <a:pPr marL="914400" lvl="0" indent="-342900" algn="l" rtl="0">
@@ -9687,10 +9934,10 @@
               <a:buAutoNum type="arabicPeriod"/>
             </a:pPr>
             <a:r>
-              <a:rPr lang="en"/>
+              <a:rPr lang="en" dirty="0"/>
               <a:t>Sealed-Secret operator will generate the secret inside each cluster </a:t>
             </a:r>
-            <a:endParaRPr/>
+            <a:endParaRPr dirty="0"/>
           </a:p>
           <a:p>
             <a:pPr marL="457200" lvl="0" indent="-342900" algn="l" rtl="0">
@@ -9704,10 +9951,18 @@
               <a:buChar char="●"/>
             </a:pPr>
             <a:r>
-              <a:rPr lang="en"/>
-              <a:t>Secrets inside kubernetes are protected using RBAC</a:t>
+              <a:rPr lang="en" dirty="0"/>
+              <a:t>Secrets inside </a:t>
             </a:r>
-            <a:endParaRPr/>
+            <a:r>
+              <a:rPr lang="en" dirty="0" err="1"/>
+              <a:t>kubernetes</a:t>
+            </a:r>
+            <a:r>
+              <a:rPr lang="en" dirty="0"/>
+              <a:t> are protected using RBAC</a:t>
+            </a:r>
+            <a:endParaRPr dirty="0"/>
           </a:p>
           <a:p>
             <a:pPr marL="457200" lvl="0" indent="-342900" algn="l" rtl="0">
@@ -9721,10 +9976,10 @@
               <a:buChar char="●"/>
             </a:pPr>
             <a:r>
-              <a:rPr lang="en"/>
+              <a:rPr lang="en" dirty="0"/>
               <a:t>Secrets can be different for each environment </a:t>
             </a:r>
-            <a:endParaRPr/>
+            <a:endParaRPr dirty="0"/>
           </a:p>
           <a:p>
             <a:pPr marL="457200" lvl="0" indent="-342900" algn="l" rtl="0">
@@ -9738,10 +9993,10 @@
               <a:buChar char="●"/>
             </a:pPr>
             <a:r>
-              <a:rPr lang="en"/>
+              <a:rPr lang="en" dirty="0"/>
               <a:t>Adding the encrypted secrets to the repository keeps track of history and changes responsibility</a:t>
             </a:r>
-            <a:endParaRPr/>
+            <a:endParaRPr dirty="0"/>
           </a:p>
         </p:txBody>
       </p:sp>

</xml_diff>